<commit_message>
trying to get RTMB shapes to work
</commit_message>
<xml_diff>
--- a/outputs/shapeconst_talk.pptx
+++ b/outputs/shapeconst_talk.pptx
@@ -81,7 +81,7 @@
         <p:txBody>
           <a:bodyPr/>
           <a:p>
-            <a:fld id="{CE7B38D5-9BAC-416D-9469-56B9CE23B54A}" type="slidenum">
+            <a:fld id="{E27076BE-AB96-4BF3-9AD0-1990480DD15E}" type="slidenum">
               <a:t>&lt;#&gt;</a:t>
             </a:fld>
           </a:p>
@@ -269,7 +269,7 @@
         <p:txBody>
           <a:bodyPr/>
           <a:p>
-            <a:fld id="{CC7D0B50-4FE5-474C-9E53-AE0A89F9037B}" type="slidenum">
+            <a:fld id="{2A703E3C-B4D0-4F18-BD42-418B81C819B3}" type="slidenum">
               <a:t>&lt;#&gt;</a:t>
             </a:fld>
           </a:p>
@@ -525,7 +525,7 @@
         <p:txBody>
           <a:bodyPr/>
           <a:p>
-            <a:fld id="{358FD34B-1CD8-4400-80AB-5126093477E8}" type="slidenum">
+            <a:fld id="{BD0C1BF0-64F9-4553-8F20-1C3E48AA383B}" type="slidenum">
               <a:t>&lt;#&gt;</a:t>
             </a:fld>
           </a:p>
@@ -849,7 +849,7 @@
         <p:txBody>
           <a:bodyPr/>
           <a:p>
-            <a:fld id="{F82F2DEB-01AC-486A-97D8-3CB0BA4004F5}" type="slidenum">
+            <a:fld id="{EEA72643-9216-489C-B729-CF8DD4D34E64}" type="slidenum">
               <a:t>&lt;#&gt;</a:t>
             </a:fld>
           </a:p>
@@ -1006,7 +1006,7 @@
         <p:txBody>
           <a:bodyPr/>
           <a:p>
-            <a:fld id="{2150A728-0EDF-49E8-ADDE-90D4A5E15948}" type="slidenum">
+            <a:fld id="{C3619C56-77EE-4056-9AA6-5B1751F26D82}" type="slidenum">
               <a:t>&lt;#&gt;</a:t>
             </a:fld>
           </a:p>
@@ -1160,7 +1160,7 @@
         <p:txBody>
           <a:bodyPr/>
           <a:p>
-            <a:fld id="{3712E473-27F9-4485-85ED-35E2356A7BCF}" type="slidenum">
+            <a:fld id="{75E04AA0-E483-4CCD-8397-AFA22E842575}" type="slidenum">
               <a:t>&lt;#&gt;</a:t>
             </a:fld>
           </a:p>
@@ -1348,7 +1348,7 @@
         <p:txBody>
           <a:bodyPr/>
           <a:p>
-            <a:fld id="{3762D4F8-85C4-40C3-A3B9-6EB2C5537E97}" type="slidenum">
+            <a:fld id="{7D3361A8-9644-43D5-BB85-BDA4E552A743}" type="slidenum">
               <a:t>&lt;#&gt;</a:t>
             </a:fld>
           </a:p>
@@ -1468,7 +1468,7 @@
         <p:txBody>
           <a:bodyPr/>
           <a:p>
-            <a:fld id="{4D2872C8-668F-41C4-B34A-56EA6F2C9D62}" type="slidenum">
+            <a:fld id="{12FAF36A-379D-4F9C-B0BB-3235815C0D4E}" type="slidenum">
               <a:t>&lt;#&gt;</a:t>
             </a:fld>
           </a:p>
@@ -1588,7 +1588,7 @@
         <p:txBody>
           <a:bodyPr/>
           <a:p>
-            <a:fld id="{ABB06EF6-7601-481E-ADEB-B9E9D33BB82C}" type="slidenum">
+            <a:fld id="{E4F89C8B-2253-4161-BC5E-1CF2CDC4B5D1}" type="slidenum">
               <a:t>&lt;#&gt;</a:t>
             </a:fld>
           </a:p>
@@ -1810,7 +1810,7 @@
         <p:txBody>
           <a:bodyPr/>
           <a:p>
-            <a:fld id="{E308BAB8-4854-4A36-8A0B-068BE5E8A64C}" type="slidenum">
+            <a:fld id="{8175BFED-BBA0-470A-BE8B-96D9EDCCDE11}" type="slidenum">
               <a:t>&lt;#&gt;</a:t>
             </a:fld>
           </a:p>
@@ -2032,7 +2032,7 @@
         <p:txBody>
           <a:bodyPr/>
           <a:p>
-            <a:fld id="{8468E0B5-63F4-4E73-B34E-7528167DBBB2}" type="slidenum">
+            <a:fld id="{5CE125AE-3AB4-4EF6-9A79-97F6F8FADD7E}" type="slidenum">
               <a:t>&lt;#&gt;</a:t>
             </a:fld>
           </a:p>
@@ -2254,7 +2254,7 @@
         <p:txBody>
           <a:bodyPr/>
           <a:p>
-            <a:fld id="{972603C3-8556-4677-99F4-0262722A377F}" type="slidenum">
+            <a:fld id="{10A52722-3065-47BC-9493-8492D6383DBE}" type="slidenum">
               <a:t>&lt;#&gt;</a:t>
             </a:fld>
           </a:p>
@@ -2666,7 +2666,7 @@
             <a:pPr algn="r">
               <a:buNone/>
             </a:pPr>
-            <a:fld id="{982A97B9-6782-409A-9AAA-5DC7600CA7B6}" type="slidenum">
+            <a:fld id="{DA065C42-1888-473E-A53B-E80E631D1BD3}" type="slidenum">
               <a:rPr b="0" lang="en-CA" sz="1400" spc="-1" strike="noStrike">
                 <a:latin typeface="Times New Roman"/>
               </a:rPr>
@@ -2727,8 +2727,8 @@
         </p:blipFill>
         <p:spPr>
           <a:xfrm>
-            <a:off x="1371240" y="0"/>
-            <a:ext cx="7337520" cy="5670000"/>
+            <a:off x="1028160" y="0"/>
+            <a:ext cx="8023320" cy="5670000"/>
           </a:xfrm>
           <a:prstGeom prst="rect">
             <a:avLst/>
@@ -2780,8 +2780,8 @@
         </p:blipFill>
         <p:spPr>
           <a:xfrm>
-            <a:off x="1371240" y="0"/>
-            <a:ext cx="7337520" cy="5670000"/>
+            <a:off x="1028160" y="0"/>
+            <a:ext cx="8023320" cy="5670000"/>
           </a:xfrm>
           <a:prstGeom prst="rect">
             <a:avLst/>
@@ -2833,8 +2833,8 @@
         </p:blipFill>
         <p:spPr>
           <a:xfrm>
-            <a:off x="1371240" y="0"/>
-            <a:ext cx="7337520" cy="5670000"/>
+            <a:off x="1028160" y="0"/>
+            <a:ext cx="8023320" cy="5670000"/>
           </a:xfrm>
           <a:prstGeom prst="rect">
             <a:avLst/>
@@ -2886,8 +2886,8 @@
         </p:blipFill>
         <p:spPr>
           <a:xfrm>
-            <a:off x="1371240" y="0"/>
-            <a:ext cx="7337520" cy="5670000"/>
+            <a:off x="1028160" y="0"/>
+            <a:ext cx="8023320" cy="5670000"/>
           </a:xfrm>
           <a:prstGeom prst="rect">
             <a:avLst/>
@@ -2939,8 +2939,8 @@
         </p:blipFill>
         <p:spPr>
           <a:xfrm>
-            <a:off x="1371240" y="0"/>
-            <a:ext cx="7337520" cy="5670000"/>
+            <a:off x="1028160" y="0"/>
+            <a:ext cx="8023320" cy="5670000"/>
           </a:xfrm>
           <a:prstGeom prst="rect">
             <a:avLst/>
@@ -2992,8 +2992,8 @@
         </p:blipFill>
         <p:spPr>
           <a:xfrm>
-            <a:off x="1371240" y="0"/>
-            <a:ext cx="7337520" cy="5670000"/>
+            <a:off x="1028160" y="0"/>
+            <a:ext cx="8023320" cy="5670000"/>
           </a:xfrm>
           <a:prstGeom prst="rect">
             <a:avLst/>
@@ -3045,8 +3045,8 @@
         </p:blipFill>
         <p:spPr>
           <a:xfrm>
-            <a:off x="1371240" y="0"/>
-            <a:ext cx="7337520" cy="5670000"/>
+            <a:off x="1028160" y="0"/>
+            <a:ext cx="8023320" cy="5670000"/>
           </a:xfrm>
           <a:prstGeom prst="rect">
             <a:avLst/>
@@ -3098,8 +3098,8 @@
         </p:blipFill>
         <p:spPr>
           <a:xfrm>
-            <a:off x="1371240" y="0"/>
-            <a:ext cx="7337520" cy="5670000"/>
+            <a:off x="1028160" y="0"/>
+            <a:ext cx="8023320" cy="5670000"/>
           </a:xfrm>
           <a:prstGeom prst="rect">
             <a:avLst/>
@@ -3151,8 +3151,8 @@
         </p:blipFill>
         <p:spPr>
           <a:xfrm>
-            <a:off x="1371240" y="0"/>
-            <a:ext cx="7337520" cy="5670000"/>
+            <a:off x="1028160" y="0"/>
+            <a:ext cx="8023320" cy="5670000"/>
           </a:xfrm>
           <a:prstGeom prst="rect">
             <a:avLst/>
@@ -3204,8 +3204,8 @@
         </p:blipFill>
         <p:spPr>
           <a:xfrm>
-            <a:off x="1371240" y="0"/>
-            <a:ext cx="7337520" cy="5670000"/>
+            <a:off x="1028160" y="0"/>
+            <a:ext cx="8023320" cy="5670000"/>
           </a:xfrm>
           <a:prstGeom prst="rect">
             <a:avLst/>
@@ -3257,8 +3257,8 @@
         </p:blipFill>
         <p:spPr>
           <a:xfrm>
-            <a:off x="1371240" y="0"/>
-            <a:ext cx="7337520" cy="5670000"/>
+            <a:off x="1028160" y="0"/>
+            <a:ext cx="8023320" cy="5670000"/>
           </a:xfrm>
           <a:prstGeom prst="rect">
             <a:avLst/>
@@ -3310,8 +3310,8 @@
         </p:blipFill>
         <p:spPr>
           <a:xfrm>
-            <a:off x="1371240" y="0"/>
-            <a:ext cx="7337520" cy="5670000"/>
+            <a:off x="1028160" y="0"/>
+            <a:ext cx="8023320" cy="5670000"/>
           </a:xfrm>
           <a:prstGeom prst="rect">
             <a:avLst/>
@@ -3363,8 +3363,8 @@
         </p:blipFill>
         <p:spPr>
           <a:xfrm>
-            <a:off x="1371240" y="0"/>
-            <a:ext cx="7337520" cy="5670000"/>
+            <a:off x="1028160" y="0"/>
+            <a:ext cx="8023320" cy="5670000"/>
           </a:xfrm>
           <a:prstGeom prst="rect">
             <a:avLst/>
@@ -3416,8 +3416,8 @@
         </p:blipFill>
         <p:spPr>
           <a:xfrm>
-            <a:off x="1371240" y="0"/>
-            <a:ext cx="7337520" cy="5670000"/>
+            <a:off x="1028160" y="0"/>
+            <a:ext cx="8023320" cy="5670000"/>
           </a:xfrm>
           <a:prstGeom prst="rect">
             <a:avLst/>
@@ -3469,8 +3469,8 @@
         </p:blipFill>
         <p:spPr>
           <a:xfrm>
-            <a:off x="1371240" y="0"/>
-            <a:ext cx="7337520" cy="5670000"/>
+            <a:off x="1028160" y="0"/>
+            <a:ext cx="8023320" cy="5670000"/>
           </a:xfrm>
           <a:prstGeom prst="rect">
             <a:avLst/>
@@ -3522,8 +3522,8 @@
         </p:blipFill>
         <p:spPr>
           <a:xfrm>
-            <a:off x="1371240" y="0"/>
-            <a:ext cx="7337520" cy="5670000"/>
+            <a:off x="1028160" y="0"/>
+            <a:ext cx="8023320" cy="5670000"/>
           </a:xfrm>
           <a:prstGeom prst="rect">
             <a:avLst/>
@@ -3575,8 +3575,8 @@
         </p:blipFill>
         <p:spPr>
           <a:xfrm>
-            <a:off x="1371240" y="0"/>
-            <a:ext cx="7337520" cy="5670000"/>
+            <a:off x="1028160" y="0"/>
+            <a:ext cx="8023320" cy="5670000"/>
           </a:xfrm>
           <a:prstGeom prst="rect">
             <a:avLst/>
@@ -3628,8 +3628,8 @@
         </p:blipFill>
         <p:spPr>
           <a:xfrm>
-            <a:off x="1371240" y="0"/>
-            <a:ext cx="7337520" cy="5670000"/>
+            <a:off x="1028160" y="0"/>
+            <a:ext cx="8023320" cy="5670000"/>
           </a:xfrm>
           <a:prstGeom prst="rect">
             <a:avLst/>
@@ -3681,8 +3681,8 @@
         </p:blipFill>
         <p:spPr>
           <a:xfrm>
-            <a:off x="1371240" y="0"/>
-            <a:ext cx="7337520" cy="5670000"/>
+            <a:off x="1028160" y="0"/>
+            <a:ext cx="8023320" cy="5670000"/>
           </a:xfrm>
           <a:prstGeom prst="rect">
             <a:avLst/>

</xml_diff>